<commit_message>
New notes on Crypto Theory and presentation notes
</commit_message>
<xml_diff>
--- a/Notes/Title Lorem Ipsum.pptx
+++ b/Notes/Title Lorem Ipsum.pptx
@@ -10,7 +10,8 @@
     <p:sldId id="262" r:id="rId4"/>
     <p:sldId id="260" r:id="rId5"/>
     <p:sldId id="263" r:id="rId6"/>
-    <p:sldId id="261" r:id="rId7"/>
+    <p:sldId id="264" r:id="rId7"/>
+    <p:sldId id="261" r:id="rId8"/>
   </p:sldIdLst>
   <p:sldSz cx="12192000" cy="6858000"/>
   <p:notesSz cx="6858000" cy="9144000"/>
@@ -361,7 +362,7 @@
           <a:p>
             <a:fld id="{9184DA70-C731-4C70-880D-CCD4705E623C}" type="datetime1">
               <a:rPr lang="en-US" smtClean="0"/>
-              <a:t>1/26/2022</a:t>
+              <a:t>1/28/2022</a:t>
             </a:fld>
             <a:endParaRPr lang="en-US" dirty="0"/>
           </a:p>
@@ -549,7 +550,7 @@
           <a:p>
             <a:fld id="{B612A279-0833-481D-8C56-F67FD0AC6C50}" type="datetime1">
               <a:rPr lang="en-US" smtClean="0"/>
-              <a:t>1/26/2022</a:t>
+              <a:t>1/28/2022</a:t>
             </a:fld>
             <a:endParaRPr lang="en-US" dirty="0"/>
           </a:p>
@@ -791,7 +792,7 @@
           <a:p>
             <a:fld id="{6587DA83-5663-4C9C-B9AA-0B40A3DAFF81}" type="datetime1">
               <a:rPr lang="en-US" smtClean="0"/>
-              <a:t>1/26/2022</a:t>
+              <a:t>1/28/2022</a:t>
             </a:fld>
             <a:endParaRPr lang="en-US" dirty="0"/>
           </a:p>
@@ -979,7 +980,7 @@
           <a:p>
             <a:fld id="{4BE1D723-8F53-4F53-90B0-1982A396982E}" type="datetime1">
               <a:rPr lang="en-US" smtClean="0"/>
-              <a:t>1/26/2022</a:t>
+              <a:t>1/28/2022</a:t>
             </a:fld>
             <a:endParaRPr lang="en-US" dirty="0"/>
           </a:p>
@@ -1352,7 +1353,7 @@
           <a:p>
             <a:fld id="{97669AF7-7BEB-44E4-9852-375E34362B5B}" type="datetime1">
               <a:rPr lang="en-US" smtClean="0"/>
-              <a:t>1/26/2022</a:t>
+              <a:t>1/28/2022</a:t>
             </a:fld>
             <a:endParaRPr lang="en-US" dirty="0"/>
           </a:p>
@@ -1607,7 +1608,7 @@
           <a:p>
             <a:fld id="{BAAAC38D-0552-4C82-B593-E6124DFADBE2}" type="datetime1">
               <a:rPr lang="en-US" smtClean="0"/>
-              <a:t>1/26/2022</a:t>
+              <a:t>1/28/2022</a:t>
             </a:fld>
             <a:endParaRPr lang="en-US" dirty="0"/>
           </a:p>
@@ -2004,7 +2005,7 @@
           <a:p>
             <a:fld id="{D9DF0F1C-5577-4ACB-BB62-DF8F3C494C7E}" type="datetime1">
               <a:rPr lang="en-US" smtClean="0"/>
-              <a:t>1/26/2022</a:t>
+              <a:t>1/28/2022</a:t>
             </a:fld>
             <a:endParaRPr lang="en-US" dirty="0"/>
           </a:p>
@@ -2140,7 +2141,7 @@
           <a:p>
             <a:fld id="{1775B394-D9F9-4F0C-B15D-605F45CB9E9F}" type="datetime1">
               <a:rPr lang="en-US" smtClean="0"/>
-              <a:t>1/26/2022</a:t>
+              <a:t>1/28/2022</a:t>
             </a:fld>
             <a:endParaRPr lang="en-US" dirty="0"/>
           </a:p>
@@ -2297,7 +2298,7 @@
           <a:p>
             <a:fld id="{39667345-2558-425A-8533-9BFDBCE15005}" type="datetime1">
               <a:rPr lang="en-US" smtClean="0"/>
-              <a:t>1/26/2022</a:t>
+              <a:t>1/28/2022</a:t>
             </a:fld>
             <a:endParaRPr lang="en-US" dirty="0"/>
           </a:p>
@@ -2626,7 +2627,7 @@
           <a:p>
             <a:fld id="{92BEA474-078D-4E9B-9B14-09A87B19DC46}" type="datetime1">
               <a:rPr lang="en-US" smtClean="0"/>
-              <a:t>1/26/2022</a:t>
+              <a:t>1/28/2022</a:t>
             </a:fld>
             <a:endParaRPr lang="en-US" dirty="0"/>
           </a:p>
@@ -2976,7 +2977,7 @@
           <a:p>
             <a:fld id="{4907D986-8816-4272-A432-0437A28A9828}" type="datetime1">
               <a:rPr lang="en-US" smtClean="0"/>
-              <a:t>1/26/2022</a:t>
+              <a:t>1/28/2022</a:t>
             </a:fld>
             <a:endParaRPr lang="en-US" dirty="0"/>
           </a:p>
@@ -3237,7 +3238,7 @@
           <a:p>
             <a:fld id="{62D6E202-B606-4609-B914-27C9371A1F6D}" type="datetime1">
               <a:rPr lang="en-US" smtClean="0"/>
-              <a:t>1/26/2022</a:t>
+              <a:t>1/28/2022</a:t>
             </a:fld>
             <a:endParaRPr lang="en-US" dirty="0"/>
           </a:p>
@@ -3846,19 +3847,19 @@
         </p:nvSpPr>
         <p:spPr>
           <a:xfrm>
-            <a:off x="5289754" y="639097"/>
-            <a:ext cx="6253317" cy="3686015"/>
+            <a:off x="2554942" y="639097"/>
+            <a:ext cx="8988130" cy="3686015"/>
           </a:xfrm>
         </p:spPr>
         <p:txBody>
           <a:bodyPr>
-            <a:normAutofit/>
+            <a:normAutofit fontScale="90000"/>
           </a:bodyPr>
           <a:lstStyle/>
           <a:p>
             <a:r>
               <a:rPr lang="en-US" sz="8000" dirty="0"/>
-              <a:t>Title Lorem Ipsum</a:t>
+              <a:t>Pay-As-You-Go Monetization using Crypto Mining</a:t>
             </a:r>
           </a:p>
         </p:txBody>
@@ -3881,8 +3882,8 @@
         </p:nvSpPr>
         <p:spPr>
           <a:xfrm>
-            <a:off x="5289753" y="4672739"/>
-            <a:ext cx="6269347" cy="1021498"/>
+            <a:off x="5325035" y="4672739"/>
+            <a:ext cx="6234066" cy="1021498"/>
           </a:xfrm>
         </p:spPr>
         <p:txBody>
@@ -3892,7 +3893,7 @@
           <a:lstStyle/>
           <a:p>
             <a:r>
-              <a:rPr lang="en-US" sz="2400" dirty="0">
+              <a:rPr lang="en-US" dirty="0">
                 <a:solidFill>
                   <a:schemeClr val="tx1">
                     <a:lumMod val="85000"/>
@@ -3900,8 +3901,16 @@
                   </a:schemeClr>
                 </a:solidFill>
               </a:rPr>
-              <a:t>Sit Dolor Amet</a:t>
-            </a:r>
+              <a:t>Billy thornton</a:t>
+            </a:r>
+            <a:endParaRPr lang="en-US" sz="2400" dirty="0">
+              <a:solidFill>
+                <a:schemeClr val="tx1">
+                  <a:lumMod val="85000"/>
+                  <a:lumOff val="15000"/>
+                </a:schemeClr>
+              </a:solidFill>
+            </a:endParaRPr>
           </a:p>
         </p:txBody>
       </p:sp>
@@ -5350,6 +5359,881 @@
           </a:p>
         </p:txBody>
       </p:sp>
+      <p:sp>
+        <p:nvSpPr>
+          <p:cNvPr id="3" name="Oval 2">
+            <a:extLst>
+              <a:ext uri="{FF2B5EF4-FFF2-40B4-BE49-F238E27FC236}">
+                <a16:creationId xmlns:a16="http://schemas.microsoft.com/office/drawing/2014/main" id="{E780DEF4-A62F-4B6D-A6C0-86E5FB29CFCF}"/>
+              </a:ext>
+            </a:extLst>
+          </p:cNvPr>
+          <p:cNvSpPr/>
+          <p:nvPr/>
+        </p:nvSpPr>
+        <p:spPr>
+          <a:xfrm>
+            <a:off x="821636" y="2845224"/>
+            <a:ext cx="2160104" cy="2071333"/>
+          </a:xfrm>
+          <a:prstGeom prst="ellipse">
+            <a:avLst/>
+          </a:prstGeom>
+        </p:spPr>
+        <p:style>
+          <a:lnRef idx="3">
+            <a:schemeClr val="lt1"/>
+          </a:lnRef>
+          <a:fillRef idx="1">
+            <a:schemeClr val="accent2"/>
+          </a:fillRef>
+          <a:effectRef idx="1">
+            <a:schemeClr val="accent2"/>
+          </a:effectRef>
+          <a:fontRef idx="minor">
+            <a:schemeClr val="lt1"/>
+          </a:fontRef>
+        </p:style>
+        <p:txBody>
+          <a:bodyPr rtlCol="0" anchor="ctr"/>
+          <a:lstStyle/>
+          <a:p>
+            <a:pPr algn="ctr"/>
+            <a:r>
+              <a:rPr lang="en-GB" dirty="0">
+                <a:latin typeface="Arial Black" panose="020B0A04020102020204" pitchFamily="34" charset="0"/>
+              </a:rPr>
+              <a:t>Block Reward</a:t>
+            </a:r>
+          </a:p>
+          <a:p>
+            <a:pPr algn="ctr"/>
+            <a:r>
+              <a:rPr lang="en-GB" dirty="0">
+                <a:latin typeface="Arial Black" panose="020B0A04020102020204" pitchFamily="34" charset="0"/>
+              </a:rPr>
+              <a:t>(5 Coins)</a:t>
+            </a:r>
+          </a:p>
+        </p:txBody>
+      </p:sp>
+      <p:sp>
+        <p:nvSpPr>
+          <p:cNvPr id="5" name="Oval 4">
+            <a:extLst>
+              <a:ext uri="{FF2B5EF4-FFF2-40B4-BE49-F238E27FC236}">
+                <a16:creationId xmlns:a16="http://schemas.microsoft.com/office/drawing/2014/main" id="{3370CE90-F334-424E-9CBF-0C290ADBB777}"/>
+              </a:ext>
+            </a:extLst>
+          </p:cNvPr>
+          <p:cNvSpPr/>
+          <p:nvPr/>
+        </p:nvSpPr>
+        <p:spPr>
+          <a:xfrm>
+            <a:off x="7634087" y="4495702"/>
+            <a:ext cx="1249878" cy="1249878"/>
+          </a:xfrm>
+          <a:prstGeom prst="ellipse">
+            <a:avLst/>
+          </a:prstGeom>
+        </p:spPr>
+        <p:style>
+          <a:lnRef idx="2">
+            <a:schemeClr val="accent4">
+              <a:shade val="50000"/>
+            </a:schemeClr>
+          </a:lnRef>
+          <a:fillRef idx="1">
+            <a:schemeClr val="accent4"/>
+          </a:fillRef>
+          <a:effectRef idx="0">
+            <a:schemeClr val="accent4"/>
+          </a:effectRef>
+          <a:fontRef idx="minor">
+            <a:schemeClr val="lt1"/>
+          </a:fontRef>
+        </p:style>
+        <p:txBody>
+          <a:bodyPr rtlCol="0" anchor="ctr"/>
+          <a:lstStyle/>
+          <a:p>
+            <a:pPr algn="ctr"/>
+            <a:r>
+              <a:rPr lang="en-GB" dirty="0">
+                <a:latin typeface="Arial Black" panose="020B0A04020102020204" pitchFamily="34" charset="0"/>
+              </a:rPr>
+              <a:t>Miner 5</a:t>
+            </a:r>
+          </a:p>
+        </p:txBody>
+      </p:sp>
+      <p:sp>
+        <p:nvSpPr>
+          <p:cNvPr id="6" name="Oval 5">
+            <a:extLst>
+              <a:ext uri="{FF2B5EF4-FFF2-40B4-BE49-F238E27FC236}">
+                <a16:creationId xmlns:a16="http://schemas.microsoft.com/office/drawing/2014/main" id="{312E4107-A61C-486C-808D-5ED0F26B4B08}"/>
+              </a:ext>
+            </a:extLst>
+          </p:cNvPr>
+          <p:cNvSpPr/>
+          <p:nvPr/>
+        </p:nvSpPr>
+        <p:spPr>
+          <a:xfrm>
+            <a:off x="7634087" y="2631012"/>
+            <a:ext cx="1249878" cy="1249878"/>
+          </a:xfrm>
+          <a:prstGeom prst="ellipse">
+            <a:avLst/>
+          </a:prstGeom>
+        </p:spPr>
+        <p:style>
+          <a:lnRef idx="2">
+            <a:schemeClr val="accent4">
+              <a:shade val="50000"/>
+            </a:schemeClr>
+          </a:lnRef>
+          <a:fillRef idx="1">
+            <a:schemeClr val="accent4"/>
+          </a:fillRef>
+          <a:effectRef idx="0">
+            <a:schemeClr val="accent4"/>
+          </a:effectRef>
+          <a:fontRef idx="minor">
+            <a:schemeClr val="lt1"/>
+          </a:fontRef>
+        </p:style>
+        <p:txBody>
+          <a:bodyPr rtlCol="0" anchor="ctr"/>
+          <a:lstStyle/>
+          <a:p>
+            <a:pPr algn="ctr"/>
+            <a:r>
+              <a:rPr lang="en-GB" dirty="0">
+                <a:latin typeface="Arial Black" panose="020B0A04020102020204" pitchFamily="34" charset="0"/>
+              </a:rPr>
+              <a:t>Miner 4</a:t>
+            </a:r>
+          </a:p>
+        </p:txBody>
+      </p:sp>
+      <p:sp>
+        <p:nvSpPr>
+          <p:cNvPr id="7" name="Oval 6">
+            <a:extLst>
+              <a:ext uri="{FF2B5EF4-FFF2-40B4-BE49-F238E27FC236}">
+                <a16:creationId xmlns:a16="http://schemas.microsoft.com/office/drawing/2014/main" id="{F005A77F-EDCE-4823-8230-D3A121768E5D}"/>
+              </a:ext>
+            </a:extLst>
+          </p:cNvPr>
+          <p:cNvSpPr/>
+          <p:nvPr/>
+        </p:nvSpPr>
+        <p:spPr>
+          <a:xfrm>
+            <a:off x="3614515" y="2245093"/>
+            <a:ext cx="1249878" cy="1249878"/>
+          </a:xfrm>
+          <a:prstGeom prst="ellipse">
+            <a:avLst/>
+          </a:prstGeom>
+        </p:spPr>
+        <p:style>
+          <a:lnRef idx="2">
+            <a:schemeClr val="accent4">
+              <a:shade val="50000"/>
+            </a:schemeClr>
+          </a:lnRef>
+          <a:fillRef idx="1">
+            <a:schemeClr val="accent4"/>
+          </a:fillRef>
+          <a:effectRef idx="0">
+            <a:schemeClr val="accent4"/>
+          </a:effectRef>
+          <a:fontRef idx="minor">
+            <a:schemeClr val="lt1"/>
+          </a:fontRef>
+        </p:style>
+        <p:txBody>
+          <a:bodyPr rtlCol="0" anchor="ctr"/>
+          <a:lstStyle/>
+          <a:p>
+            <a:pPr algn="ctr"/>
+            <a:r>
+              <a:rPr lang="en-GB" dirty="0">
+                <a:latin typeface="Arial Black" panose="020B0A04020102020204" pitchFamily="34" charset="0"/>
+              </a:rPr>
+              <a:t>Miner 1</a:t>
+            </a:r>
+          </a:p>
+        </p:txBody>
+      </p:sp>
+      <p:sp>
+        <p:nvSpPr>
+          <p:cNvPr id="8" name="Oval 7">
+            <a:extLst>
+              <a:ext uri="{FF2B5EF4-FFF2-40B4-BE49-F238E27FC236}">
+                <a16:creationId xmlns:a16="http://schemas.microsoft.com/office/drawing/2014/main" id="{A9FFD982-EB69-41A5-9EA9-EC21989EED04}"/>
+              </a:ext>
+            </a:extLst>
+          </p:cNvPr>
+          <p:cNvSpPr/>
+          <p:nvPr/>
+        </p:nvSpPr>
+        <p:spPr>
+          <a:xfrm>
+            <a:off x="3614515" y="3558541"/>
+            <a:ext cx="1249878" cy="1249878"/>
+          </a:xfrm>
+          <a:prstGeom prst="ellipse">
+            <a:avLst/>
+          </a:prstGeom>
+        </p:spPr>
+        <p:style>
+          <a:lnRef idx="2">
+            <a:schemeClr val="accent4">
+              <a:shade val="50000"/>
+            </a:schemeClr>
+          </a:lnRef>
+          <a:fillRef idx="1">
+            <a:schemeClr val="accent4"/>
+          </a:fillRef>
+          <a:effectRef idx="0">
+            <a:schemeClr val="accent4"/>
+          </a:effectRef>
+          <a:fontRef idx="minor">
+            <a:schemeClr val="lt1"/>
+          </a:fontRef>
+        </p:style>
+        <p:txBody>
+          <a:bodyPr rtlCol="0" anchor="ctr"/>
+          <a:lstStyle/>
+          <a:p>
+            <a:pPr algn="ctr"/>
+            <a:r>
+              <a:rPr lang="en-GB" dirty="0">
+                <a:latin typeface="Arial Black" panose="020B0A04020102020204" pitchFamily="34" charset="0"/>
+              </a:rPr>
+              <a:t>Miner 2</a:t>
+            </a:r>
+          </a:p>
+        </p:txBody>
+      </p:sp>
+      <p:sp>
+        <p:nvSpPr>
+          <p:cNvPr id="9" name="Oval 8">
+            <a:extLst>
+              <a:ext uri="{FF2B5EF4-FFF2-40B4-BE49-F238E27FC236}">
+                <a16:creationId xmlns:a16="http://schemas.microsoft.com/office/drawing/2014/main" id="{127891F3-02A3-4A4C-8305-25DA41499C83}"/>
+              </a:ext>
+            </a:extLst>
+          </p:cNvPr>
+          <p:cNvSpPr/>
+          <p:nvPr/>
+        </p:nvSpPr>
+        <p:spPr>
+          <a:xfrm>
+            <a:off x="3614515" y="4932443"/>
+            <a:ext cx="1249878" cy="1249878"/>
+          </a:xfrm>
+          <a:prstGeom prst="ellipse">
+            <a:avLst/>
+          </a:prstGeom>
+        </p:spPr>
+        <p:style>
+          <a:lnRef idx="2">
+            <a:schemeClr val="accent4">
+              <a:shade val="50000"/>
+            </a:schemeClr>
+          </a:lnRef>
+          <a:fillRef idx="1">
+            <a:schemeClr val="accent4"/>
+          </a:fillRef>
+          <a:effectRef idx="0">
+            <a:schemeClr val="accent4"/>
+          </a:effectRef>
+          <a:fontRef idx="minor">
+            <a:schemeClr val="lt1"/>
+          </a:fontRef>
+        </p:style>
+        <p:txBody>
+          <a:bodyPr rtlCol="0" anchor="ctr"/>
+          <a:lstStyle/>
+          <a:p>
+            <a:pPr algn="ctr"/>
+            <a:r>
+              <a:rPr lang="en-GB" dirty="0">
+                <a:latin typeface="Arial Black" panose="020B0A04020102020204" pitchFamily="34" charset="0"/>
+              </a:rPr>
+              <a:t>Miner 3</a:t>
+            </a:r>
+          </a:p>
+        </p:txBody>
+      </p:sp>
+      <p:sp>
+        <p:nvSpPr>
+          <p:cNvPr id="11" name="Oval 10">
+            <a:extLst>
+              <a:ext uri="{FF2B5EF4-FFF2-40B4-BE49-F238E27FC236}">
+                <a16:creationId xmlns:a16="http://schemas.microsoft.com/office/drawing/2014/main" id="{10D94809-3746-4AB1-8150-A2882FB897B3}"/>
+              </a:ext>
+            </a:extLst>
+          </p:cNvPr>
+          <p:cNvSpPr/>
+          <p:nvPr/>
+        </p:nvSpPr>
+        <p:spPr>
+          <a:xfrm>
+            <a:off x="4864393" y="2877009"/>
+            <a:ext cx="583776" cy="583776"/>
+          </a:xfrm>
+          <a:prstGeom prst="ellipse">
+            <a:avLst/>
+          </a:prstGeom>
+        </p:spPr>
+        <p:style>
+          <a:lnRef idx="2">
+            <a:schemeClr val="accent2">
+              <a:shade val="50000"/>
+            </a:schemeClr>
+          </a:lnRef>
+          <a:fillRef idx="1">
+            <a:schemeClr val="accent2"/>
+          </a:fillRef>
+          <a:effectRef idx="0">
+            <a:schemeClr val="accent2"/>
+          </a:effectRef>
+          <a:fontRef idx="minor">
+            <a:schemeClr val="lt1"/>
+          </a:fontRef>
+        </p:style>
+        <p:txBody>
+          <a:bodyPr rtlCol="0" anchor="ctr"/>
+          <a:lstStyle/>
+          <a:p>
+            <a:pPr algn="ctr"/>
+            <a:endParaRPr lang="en-GB" dirty="0"/>
+          </a:p>
+        </p:txBody>
+      </p:sp>
+      <p:sp>
+        <p:nvSpPr>
+          <p:cNvPr id="12" name="Oval 11">
+            <a:extLst>
+              <a:ext uri="{FF2B5EF4-FFF2-40B4-BE49-F238E27FC236}">
+                <a16:creationId xmlns:a16="http://schemas.microsoft.com/office/drawing/2014/main" id="{D25808D4-CBAF-42D7-992E-57AED6DFC48A}"/>
+              </a:ext>
+            </a:extLst>
+          </p:cNvPr>
+          <p:cNvSpPr/>
+          <p:nvPr/>
+        </p:nvSpPr>
+        <p:spPr>
+          <a:xfrm>
+            <a:off x="4918927" y="4224643"/>
+            <a:ext cx="583776" cy="583776"/>
+          </a:xfrm>
+          <a:prstGeom prst="ellipse">
+            <a:avLst/>
+          </a:prstGeom>
+        </p:spPr>
+        <p:style>
+          <a:lnRef idx="2">
+            <a:schemeClr val="accent2">
+              <a:shade val="50000"/>
+            </a:schemeClr>
+          </a:lnRef>
+          <a:fillRef idx="1">
+            <a:schemeClr val="accent2"/>
+          </a:fillRef>
+          <a:effectRef idx="0">
+            <a:schemeClr val="accent2"/>
+          </a:effectRef>
+          <a:fontRef idx="minor">
+            <a:schemeClr val="lt1"/>
+          </a:fontRef>
+        </p:style>
+        <p:txBody>
+          <a:bodyPr rtlCol="0" anchor="ctr"/>
+          <a:lstStyle/>
+          <a:p>
+            <a:pPr algn="ctr"/>
+            <a:endParaRPr lang="en-GB" dirty="0"/>
+          </a:p>
+        </p:txBody>
+      </p:sp>
+      <p:sp>
+        <p:nvSpPr>
+          <p:cNvPr id="13" name="Oval 12">
+            <a:extLst>
+              <a:ext uri="{FF2B5EF4-FFF2-40B4-BE49-F238E27FC236}">
+                <a16:creationId xmlns:a16="http://schemas.microsoft.com/office/drawing/2014/main" id="{9F49A4AD-CDE4-4BDD-8205-97E74EB6328B}"/>
+              </a:ext>
+            </a:extLst>
+          </p:cNvPr>
+          <p:cNvSpPr/>
+          <p:nvPr/>
+        </p:nvSpPr>
+        <p:spPr>
+          <a:xfrm>
+            <a:off x="4918927" y="5557382"/>
+            <a:ext cx="583776" cy="583776"/>
+          </a:xfrm>
+          <a:prstGeom prst="ellipse">
+            <a:avLst/>
+          </a:prstGeom>
+        </p:spPr>
+        <p:style>
+          <a:lnRef idx="2">
+            <a:schemeClr val="accent2">
+              <a:shade val="50000"/>
+            </a:schemeClr>
+          </a:lnRef>
+          <a:fillRef idx="1">
+            <a:schemeClr val="accent2"/>
+          </a:fillRef>
+          <a:effectRef idx="0">
+            <a:schemeClr val="accent2"/>
+          </a:effectRef>
+          <a:fontRef idx="minor">
+            <a:schemeClr val="lt1"/>
+          </a:fontRef>
+        </p:style>
+        <p:txBody>
+          <a:bodyPr rtlCol="0" anchor="ctr"/>
+          <a:lstStyle/>
+          <a:p>
+            <a:pPr algn="ctr"/>
+            <a:endParaRPr lang="en-GB" dirty="0"/>
+          </a:p>
+        </p:txBody>
+      </p:sp>
+      <p:sp>
+        <p:nvSpPr>
+          <p:cNvPr id="14" name="Oval 13">
+            <a:extLst>
+              <a:ext uri="{FF2B5EF4-FFF2-40B4-BE49-F238E27FC236}">
+                <a16:creationId xmlns:a16="http://schemas.microsoft.com/office/drawing/2014/main" id="{F31AC99F-A3AE-417C-BDB4-878F09725CE9}"/>
+              </a:ext>
+            </a:extLst>
+          </p:cNvPr>
+          <p:cNvSpPr/>
+          <p:nvPr/>
+        </p:nvSpPr>
+        <p:spPr>
+          <a:xfrm>
+            <a:off x="8883965" y="3297114"/>
+            <a:ext cx="583776" cy="583776"/>
+          </a:xfrm>
+          <a:prstGeom prst="ellipse">
+            <a:avLst/>
+          </a:prstGeom>
+        </p:spPr>
+        <p:style>
+          <a:lnRef idx="2">
+            <a:schemeClr val="accent2">
+              <a:shade val="50000"/>
+            </a:schemeClr>
+          </a:lnRef>
+          <a:fillRef idx="1">
+            <a:schemeClr val="accent2"/>
+          </a:fillRef>
+          <a:effectRef idx="0">
+            <a:schemeClr val="accent2"/>
+          </a:effectRef>
+          <a:fontRef idx="minor">
+            <a:schemeClr val="lt1"/>
+          </a:fontRef>
+        </p:style>
+        <p:txBody>
+          <a:bodyPr rtlCol="0" anchor="ctr"/>
+          <a:lstStyle/>
+          <a:p>
+            <a:pPr algn="ctr"/>
+            <a:endParaRPr lang="en-GB" dirty="0"/>
+          </a:p>
+        </p:txBody>
+      </p:sp>
+      <p:sp>
+        <p:nvSpPr>
+          <p:cNvPr id="15" name="Oval 14">
+            <a:extLst>
+              <a:ext uri="{FF2B5EF4-FFF2-40B4-BE49-F238E27FC236}">
+                <a16:creationId xmlns:a16="http://schemas.microsoft.com/office/drawing/2014/main" id="{0DFA83DD-8389-46D2-85BF-D7D4C1B4412F}"/>
+              </a:ext>
+            </a:extLst>
+          </p:cNvPr>
+          <p:cNvSpPr/>
+          <p:nvPr/>
+        </p:nvSpPr>
+        <p:spPr>
+          <a:xfrm>
+            <a:off x="8911995" y="5161804"/>
+            <a:ext cx="583776" cy="583776"/>
+          </a:xfrm>
+          <a:prstGeom prst="ellipse">
+            <a:avLst/>
+          </a:prstGeom>
+        </p:spPr>
+        <p:style>
+          <a:lnRef idx="2">
+            <a:schemeClr val="accent2">
+              <a:shade val="50000"/>
+            </a:schemeClr>
+          </a:lnRef>
+          <a:fillRef idx="1">
+            <a:schemeClr val="accent2"/>
+          </a:fillRef>
+          <a:effectRef idx="0">
+            <a:schemeClr val="accent2"/>
+          </a:effectRef>
+          <a:fontRef idx="minor">
+            <a:schemeClr val="lt1"/>
+          </a:fontRef>
+        </p:style>
+        <p:txBody>
+          <a:bodyPr rtlCol="0" anchor="ctr"/>
+          <a:lstStyle/>
+          <a:p>
+            <a:pPr algn="ctr"/>
+            <a:endParaRPr lang="en-GB" dirty="0"/>
+          </a:p>
+        </p:txBody>
+      </p:sp>
+      <p:sp>
+        <p:nvSpPr>
+          <p:cNvPr id="16" name="Oval 15">
+            <a:extLst>
+              <a:ext uri="{FF2B5EF4-FFF2-40B4-BE49-F238E27FC236}">
+                <a16:creationId xmlns:a16="http://schemas.microsoft.com/office/drawing/2014/main" id="{CB407B46-000A-4251-A002-DE3108A97085}"/>
+              </a:ext>
+            </a:extLst>
+          </p:cNvPr>
+          <p:cNvSpPr/>
+          <p:nvPr/>
+        </p:nvSpPr>
+        <p:spPr>
+          <a:xfrm>
+            <a:off x="5665458" y="3376240"/>
+            <a:ext cx="1696806" cy="1696806"/>
+          </a:xfrm>
+          <a:prstGeom prst="ellipse">
+            <a:avLst/>
+          </a:prstGeom>
+        </p:spPr>
+        <p:style>
+          <a:lnRef idx="2">
+            <a:schemeClr val="accent1">
+              <a:shade val="50000"/>
+            </a:schemeClr>
+          </a:lnRef>
+          <a:fillRef idx="1">
+            <a:schemeClr val="accent1"/>
+          </a:fillRef>
+          <a:effectRef idx="0">
+            <a:schemeClr val="accent1"/>
+          </a:effectRef>
+          <a:fontRef idx="minor">
+            <a:schemeClr val="lt1"/>
+          </a:fontRef>
+        </p:style>
+        <p:txBody>
+          <a:bodyPr rtlCol="0" anchor="ctr"/>
+          <a:lstStyle/>
+          <a:p>
+            <a:pPr algn="ctr"/>
+            <a:r>
+              <a:rPr lang="en-GB" dirty="0">
+                <a:latin typeface="Arial Black" panose="020B0A04020102020204" pitchFamily="34" charset="0"/>
+              </a:rPr>
+              <a:t>Content Creator 1</a:t>
+            </a:r>
+          </a:p>
+        </p:txBody>
+      </p:sp>
+      <p:sp>
+        <p:nvSpPr>
+          <p:cNvPr id="17" name="Oval 16">
+            <a:extLst>
+              <a:ext uri="{FF2B5EF4-FFF2-40B4-BE49-F238E27FC236}">
+                <a16:creationId xmlns:a16="http://schemas.microsoft.com/office/drawing/2014/main" id="{FB7E1E02-04D3-41F5-9175-E356092AF30B}"/>
+              </a:ext>
+            </a:extLst>
+          </p:cNvPr>
+          <p:cNvSpPr/>
+          <p:nvPr/>
+        </p:nvSpPr>
+        <p:spPr>
+          <a:xfrm>
+            <a:off x="9673558" y="3344036"/>
+            <a:ext cx="1696806" cy="1696806"/>
+          </a:xfrm>
+          <a:prstGeom prst="ellipse">
+            <a:avLst/>
+          </a:prstGeom>
+        </p:spPr>
+        <p:style>
+          <a:lnRef idx="2">
+            <a:schemeClr val="accent1">
+              <a:shade val="50000"/>
+            </a:schemeClr>
+          </a:lnRef>
+          <a:fillRef idx="1">
+            <a:schemeClr val="accent1"/>
+          </a:fillRef>
+          <a:effectRef idx="0">
+            <a:schemeClr val="accent1"/>
+          </a:effectRef>
+          <a:fontRef idx="minor">
+            <a:schemeClr val="lt1"/>
+          </a:fontRef>
+        </p:style>
+        <p:txBody>
+          <a:bodyPr rtlCol="0" anchor="ctr"/>
+          <a:lstStyle/>
+          <a:p>
+            <a:pPr algn="ctr"/>
+            <a:r>
+              <a:rPr lang="en-GB" dirty="0">
+                <a:latin typeface="Arial Black" panose="020B0A04020102020204" pitchFamily="34" charset="0"/>
+              </a:rPr>
+              <a:t>Content Creator 2</a:t>
+            </a:r>
+          </a:p>
+        </p:txBody>
+      </p:sp>
+      <p:sp>
+        <p:nvSpPr>
+          <p:cNvPr id="18" name="Oval 17">
+            <a:extLst>
+              <a:ext uri="{FF2B5EF4-FFF2-40B4-BE49-F238E27FC236}">
+                <a16:creationId xmlns:a16="http://schemas.microsoft.com/office/drawing/2014/main" id="{AC5AF05F-764B-41E2-B9FE-4D4938B0B9BE}"/>
+              </a:ext>
+            </a:extLst>
+          </p:cNvPr>
+          <p:cNvSpPr/>
+          <p:nvPr/>
+        </p:nvSpPr>
+        <p:spPr>
+          <a:xfrm>
+            <a:off x="5726906" y="4374703"/>
+            <a:ext cx="583776" cy="583776"/>
+          </a:xfrm>
+          <a:prstGeom prst="ellipse">
+            <a:avLst/>
+          </a:prstGeom>
+        </p:spPr>
+        <p:style>
+          <a:lnRef idx="2">
+            <a:schemeClr val="accent2">
+              <a:shade val="50000"/>
+            </a:schemeClr>
+          </a:lnRef>
+          <a:fillRef idx="1">
+            <a:schemeClr val="accent2"/>
+          </a:fillRef>
+          <a:effectRef idx="0">
+            <a:schemeClr val="accent2"/>
+          </a:effectRef>
+          <a:fontRef idx="minor">
+            <a:schemeClr val="lt1"/>
+          </a:fontRef>
+        </p:style>
+        <p:txBody>
+          <a:bodyPr rtlCol="0" anchor="ctr"/>
+          <a:lstStyle/>
+          <a:p>
+            <a:pPr algn="ctr"/>
+            <a:endParaRPr lang="en-GB" dirty="0"/>
+          </a:p>
+        </p:txBody>
+      </p:sp>
+      <p:sp>
+        <p:nvSpPr>
+          <p:cNvPr id="19" name="Oval 18">
+            <a:extLst>
+              <a:ext uri="{FF2B5EF4-FFF2-40B4-BE49-F238E27FC236}">
+                <a16:creationId xmlns:a16="http://schemas.microsoft.com/office/drawing/2014/main" id="{2957406C-D553-4450-8E8C-A58C327DCBDD}"/>
+              </a:ext>
+            </a:extLst>
+          </p:cNvPr>
+          <p:cNvSpPr/>
+          <p:nvPr/>
+        </p:nvSpPr>
+        <p:spPr>
+          <a:xfrm>
+            <a:off x="5972626" y="4697232"/>
+            <a:ext cx="583776" cy="583776"/>
+          </a:xfrm>
+          <a:prstGeom prst="ellipse">
+            <a:avLst/>
+          </a:prstGeom>
+        </p:spPr>
+        <p:style>
+          <a:lnRef idx="2">
+            <a:schemeClr val="accent2">
+              <a:shade val="50000"/>
+            </a:schemeClr>
+          </a:lnRef>
+          <a:fillRef idx="1">
+            <a:schemeClr val="accent2"/>
+          </a:fillRef>
+          <a:effectRef idx="0">
+            <a:schemeClr val="accent2"/>
+          </a:effectRef>
+          <a:fontRef idx="minor">
+            <a:schemeClr val="lt1"/>
+          </a:fontRef>
+        </p:style>
+        <p:txBody>
+          <a:bodyPr rtlCol="0" anchor="ctr"/>
+          <a:lstStyle/>
+          <a:p>
+            <a:pPr algn="ctr"/>
+            <a:endParaRPr lang="en-GB" dirty="0"/>
+          </a:p>
+        </p:txBody>
+      </p:sp>
+      <p:sp>
+        <p:nvSpPr>
+          <p:cNvPr id="20" name="Oval 19">
+            <a:extLst>
+              <a:ext uri="{FF2B5EF4-FFF2-40B4-BE49-F238E27FC236}">
+                <a16:creationId xmlns:a16="http://schemas.microsoft.com/office/drawing/2014/main" id="{3D8B8996-FC15-49B4-9AFA-9E7488BBB4CF}"/>
+              </a:ext>
+            </a:extLst>
+          </p:cNvPr>
+          <p:cNvSpPr/>
+          <p:nvPr/>
+        </p:nvSpPr>
+        <p:spPr>
+          <a:xfrm>
+            <a:off x="6218346" y="4973606"/>
+            <a:ext cx="583776" cy="583776"/>
+          </a:xfrm>
+          <a:prstGeom prst="ellipse">
+            <a:avLst/>
+          </a:prstGeom>
+        </p:spPr>
+        <p:style>
+          <a:lnRef idx="2">
+            <a:schemeClr val="accent2">
+              <a:shade val="50000"/>
+            </a:schemeClr>
+          </a:lnRef>
+          <a:fillRef idx="1">
+            <a:schemeClr val="accent2"/>
+          </a:fillRef>
+          <a:effectRef idx="0">
+            <a:schemeClr val="accent2"/>
+          </a:effectRef>
+          <a:fontRef idx="minor">
+            <a:schemeClr val="lt1"/>
+          </a:fontRef>
+        </p:style>
+        <p:txBody>
+          <a:bodyPr rtlCol="0" anchor="ctr"/>
+          <a:lstStyle/>
+          <a:p>
+            <a:pPr algn="ctr"/>
+            <a:endParaRPr lang="en-GB" dirty="0"/>
+          </a:p>
+        </p:txBody>
+      </p:sp>
+      <p:sp>
+        <p:nvSpPr>
+          <p:cNvPr id="21" name="Oval 20">
+            <a:extLst>
+              <a:ext uri="{FF2B5EF4-FFF2-40B4-BE49-F238E27FC236}">
+                <a16:creationId xmlns:a16="http://schemas.microsoft.com/office/drawing/2014/main" id="{DFE91D24-2E00-4147-8640-4B1266FDA380}"/>
+              </a:ext>
+            </a:extLst>
+          </p:cNvPr>
+          <p:cNvSpPr/>
+          <p:nvPr/>
+        </p:nvSpPr>
+        <p:spPr>
+          <a:xfrm>
+            <a:off x="9736550" y="4436471"/>
+            <a:ext cx="583776" cy="583776"/>
+          </a:xfrm>
+          <a:prstGeom prst="ellipse">
+            <a:avLst/>
+          </a:prstGeom>
+        </p:spPr>
+        <p:style>
+          <a:lnRef idx="2">
+            <a:schemeClr val="accent2">
+              <a:shade val="50000"/>
+            </a:schemeClr>
+          </a:lnRef>
+          <a:fillRef idx="1">
+            <a:schemeClr val="accent2"/>
+          </a:fillRef>
+          <a:effectRef idx="0">
+            <a:schemeClr val="accent2"/>
+          </a:effectRef>
+          <a:fontRef idx="minor">
+            <a:schemeClr val="lt1"/>
+          </a:fontRef>
+        </p:style>
+        <p:txBody>
+          <a:bodyPr rtlCol="0" anchor="ctr"/>
+          <a:lstStyle/>
+          <a:p>
+            <a:pPr algn="ctr"/>
+            <a:endParaRPr lang="en-GB" dirty="0"/>
+          </a:p>
+        </p:txBody>
+      </p:sp>
+      <p:sp>
+        <p:nvSpPr>
+          <p:cNvPr id="22" name="Oval 21">
+            <a:extLst>
+              <a:ext uri="{FF2B5EF4-FFF2-40B4-BE49-F238E27FC236}">
+                <a16:creationId xmlns:a16="http://schemas.microsoft.com/office/drawing/2014/main" id="{174B2572-8CC7-4DB5-9437-784A9387B861}"/>
+              </a:ext>
+            </a:extLst>
+          </p:cNvPr>
+          <p:cNvSpPr/>
+          <p:nvPr/>
+        </p:nvSpPr>
+        <p:spPr>
+          <a:xfrm>
+            <a:off x="10056468" y="4624669"/>
+            <a:ext cx="583776" cy="583776"/>
+          </a:xfrm>
+          <a:prstGeom prst="ellipse">
+            <a:avLst/>
+          </a:prstGeom>
+        </p:spPr>
+        <p:style>
+          <a:lnRef idx="2">
+            <a:schemeClr val="accent2">
+              <a:shade val="50000"/>
+            </a:schemeClr>
+          </a:lnRef>
+          <a:fillRef idx="1">
+            <a:schemeClr val="accent2"/>
+          </a:fillRef>
+          <a:effectRef idx="0">
+            <a:schemeClr val="accent2"/>
+          </a:effectRef>
+          <a:fontRef idx="minor">
+            <a:schemeClr val="lt1"/>
+          </a:fontRef>
+        </p:style>
+        <p:txBody>
+          <a:bodyPr rtlCol="0" anchor="ctr"/>
+          <a:lstStyle/>
+          <a:p>
+            <a:pPr algn="ctr"/>
+            <a:endParaRPr lang="en-GB" dirty="0"/>
+          </a:p>
+        </p:txBody>
+      </p:sp>
     </p:spTree>
     <p:extLst>
       <p:ext uri="{BB962C8B-B14F-4D97-AF65-F5344CB8AC3E}">
@@ -5360,6 +6244,586 @@
   <p:clrMapOvr>
     <a:masterClrMapping/>
   </p:clrMapOvr>
+  <p:timing>
+    <p:tnLst>
+      <p:par>
+        <p:cTn id="1" dur="indefinite" restart="never" nodeType="tmRoot">
+          <p:childTnLst>
+            <p:seq concurrent="1" nextAc="seek">
+              <p:cTn id="2" dur="indefinite" nodeType="mainSeq">
+                <p:childTnLst>
+                  <p:par>
+                    <p:cTn id="3" fill="hold">
+                      <p:stCondLst>
+                        <p:cond delay="indefinite"/>
+                      </p:stCondLst>
+                      <p:childTnLst>
+                        <p:par>
+                          <p:cTn id="4" fill="hold">
+                            <p:stCondLst>
+                              <p:cond delay="0"/>
+                            </p:stCondLst>
+                            <p:childTnLst>
+                              <p:par>
+                                <p:cTn id="5" presetID="1" presetClass="entr" presetSubtype="0" fill="hold" grpId="0" nodeType="clickEffect">
+                                  <p:stCondLst>
+                                    <p:cond delay="0"/>
+                                  </p:stCondLst>
+                                  <p:childTnLst>
+                                    <p:set>
+                                      <p:cBhvr>
+                                        <p:cTn id="6" dur="1" fill="hold">
+                                          <p:stCondLst>
+                                            <p:cond delay="0"/>
+                                          </p:stCondLst>
+                                        </p:cTn>
+                                        <p:tgtEl>
+                                          <p:spTgt spid="11"/>
+                                        </p:tgtEl>
+                                        <p:attrNameLst>
+                                          <p:attrName>style.visibility</p:attrName>
+                                        </p:attrNameLst>
+                                      </p:cBhvr>
+                                      <p:to>
+                                        <p:strVal val="visible"/>
+                                      </p:to>
+                                    </p:set>
+                                  </p:childTnLst>
+                                </p:cTn>
+                              </p:par>
+                              <p:par>
+                                <p:cTn id="7" presetID="1" presetClass="entr" presetSubtype="0" fill="hold" grpId="0" nodeType="withEffect">
+                                  <p:stCondLst>
+                                    <p:cond delay="0"/>
+                                  </p:stCondLst>
+                                  <p:childTnLst>
+                                    <p:set>
+                                      <p:cBhvr>
+                                        <p:cTn id="8" dur="1" fill="hold">
+                                          <p:stCondLst>
+                                            <p:cond delay="0"/>
+                                          </p:stCondLst>
+                                        </p:cTn>
+                                        <p:tgtEl>
+                                          <p:spTgt spid="12"/>
+                                        </p:tgtEl>
+                                        <p:attrNameLst>
+                                          <p:attrName>style.visibility</p:attrName>
+                                        </p:attrNameLst>
+                                      </p:cBhvr>
+                                      <p:to>
+                                        <p:strVal val="visible"/>
+                                      </p:to>
+                                    </p:set>
+                                  </p:childTnLst>
+                                </p:cTn>
+                              </p:par>
+                              <p:par>
+                                <p:cTn id="9" presetID="1" presetClass="entr" presetSubtype="0" fill="hold" grpId="0" nodeType="withEffect">
+                                  <p:stCondLst>
+                                    <p:cond delay="0"/>
+                                  </p:stCondLst>
+                                  <p:childTnLst>
+                                    <p:set>
+                                      <p:cBhvr>
+                                        <p:cTn id="10" dur="1" fill="hold">
+                                          <p:stCondLst>
+                                            <p:cond delay="0"/>
+                                          </p:stCondLst>
+                                        </p:cTn>
+                                        <p:tgtEl>
+                                          <p:spTgt spid="13"/>
+                                        </p:tgtEl>
+                                        <p:attrNameLst>
+                                          <p:attrName>style.visibility</p:attrName>
+                                        </p:attrNameLst>
+                                      </p:cBhvr>
+                                      <p:to>
+                                        <p:strVal val="visible"/>
+                                      </p:to>
+                                    </p:set>
+                                  </p:childTnLst>
+                                </p:cTn>
+                              </p:par>
+                              <p:par>
+                                <p:cTn id="11" presetID="1" presetClass="entr" presetSubtype="0" fill="hold" grpId="0" nodeType="withEffect">
+                                  <p:stCondLst>
+                                    <p:cond delay="0"/>
+                                  </p:stCondLst>
+                                  <p:childTnLst>
+                                    <p:set>
+                                      <p:cBhvr>
+                                        <p:cTn id="12" dur="1" fill="hold">
+                                          <p:stCondLst>
+                                            <p:cond delay="0"/>
+                                          </p:stCondLst>
+                                        </p:cTn>
+                                        <p:tgtEl>
+                                          <p:spTgt spid="14"/>
+                                        </p:tgtEl>
+                                        <p:attrNameLst>
+                                          <p:attrName>style.visibility</p:attrName>
+                                        </p:attrNameLst>
+                                      </p:cBhvr>
+                                      <p:to>
+                                        <p:strVal val="visible"/>
+                                      </p:to>
+                                    </p:set>
+                                  </p:childTnLst>
+                                </p:cTn>
+                              </p:par>
+                              <p:par>
+                                <p:cTn id="13" presetID="1" presetClass="entr" presetSubtype="0" fill="hold" grpId="0" nodeType="withEffect">
+                                  <p:stCondLst>
+                                    <p:cond delay="0"/>
+                                  </p:stCondLst>
+                                  <p:childTnLst>
+                                    <p:set>
+                                      <p:cBhvr>
+                                        <p:cTn id="14" dur="1" fill="hold">
+                                          <p:stCondLst>
+                                            <p:cond delay="0"/>
+                                          </p:stCondLst>
+                                        </p:cTn>
+                                        <p:tgtEl>
+                                          <p:spTgt spid="15"/>
+                                        </p:tgtEl>
+                                        <p:attrNameLst>
+                                          <p:attrName>style.visibility</p:attrName>
+                                        </p:attrNameLst>
+                                      </p:cBhvr>
+                                      <p:to>
+                                        <p:strVal val="visible"/>
+                                      </p:to>
+                                    </p:set>
+                                  </p:childTnLst>
+                                </p:cTn>
+                              </p:par>
+                            </p:childTnLst>
+                          </p:cTn>
+                        </p:par>
+                      </p:childTnLst>
+                    </p:cTn>
+                  </p:par>
+                  <p:par>
+                    <p:cTn id="15" fill="hold">
+                      <p:stCondLst>
+                        <p:cond delay="indefinite"/>
+                      </p:stCondLst>
+                      <p:childTnLst>
+                        <p:par>
+                          <p:cTn id="16" fill="hold">
+                            <p:stCondLst>
+                              <p:cond delay="0"/>
+                            </p:stCondLst>
+                            <p:childTnLst>
+                              <p:par>
+                                <p:cTn id="17" presetID="1" presetClass="entr" presetSubtype="0" fill="hold" grpId="0" nodeType="clickEffect">
+                                  <p:stCondLst>
+                                    <p:cond delay="0"/>
+                                  </p:stCondLst>
+                                  <p:childTnLst>
+                                    <p:set>
+                                      <p:cBhvr>
+                                        <p:cTn id="18" dur="1" fill="hold">
+                                          <p:stCondLst>
+                                            <p:cond delay="0"/>
+                                          </p:stCondLst>
+                                        </p:cTn>
+                                        <p:tgtEl>
+                                          <p:spTgt spid="17"/>
+                                        </p:tgtEl>
+                                        <p:attrNameLst>
+                                          <p:attrName>style.visibility</p:attrName>
+                                        </p:attrNameLst>
+                                      </p:cBhvr>
+                                      <p:to>
+                                        <p:strVal val="visible"/>
+                                      </p:to>
+                                    </p:set>
+                                  </p:childTnLst>
+                                </p:cTn>
+                              </p:par>
+                              <p:par>
+                                <p:cTn id="19" presetID="1" presetClass="entr" presetSubtype="0" fill="hold" grpId="0" nodeType="withEffect">
+                                  <p:stCondLst>
+                                    <p:cond delay="0"/>
+                                  </p:stCondLst>
+                                  <p:childTnLst>
+                                    <p:set>
+                                      <p:cBhvr>
+                                        <p:cTn id="20" dur="1" fill="hold">
+                                          <p:stCondLst>
+                                            <p:cond delay="0"/>
+                                          </p:stCondLst>
+                                        </p:cTn>
+                                        <p:tgtEl>
+                                          <p:spTgt spid="16"/>
+                                        </p:tgtEl>
+                                        <p:attrNameLst>
+                                          <p:attrName>style.visibility</p:attrName>
+                                        </p:attrNameLst>
+                                      </p:cBhvr>
+                                      <p:to>
+                                        <p:strVal val="visible"/>
+                                      </p:to>
+                                    </p:set>
+                                  </p:childTnLst>
+                                </p:cTn>
+                              </p:par>
+                            </p:childTnLst>
+                          </p:cTn>
+                        </p:par>
+                      </p:childTnLst>
+                    </p:cTn>
+                  </p:par>
+                  <p:par>
+                    <p:cTn id="21" fill="hold">
+                      <p:stCondLst>
+                        <p:cond delay="indefinite"/>
+                      </p:stCondLst>
+                      <p:childTnLst>
+                        <p:par>
+                          <p:cTn id="22" fill="hold">
+                            <p:stCondLst>
+                              <p:cond delay="0"/>
+                            </p:stCondLst>
+                            <p:childTnLst>
+                              <p:par>
+                                <p:cTn id="23" presetID="1" presetClass="entr" presetSubtype="0" fill="hold" grpId="0" nodeType="clickEffect">
+                                  <p:stCondLst>
+                                    <p:cond delay="0"/>
+                                  </p:stCondLst>
+                                  <p:childTnLst>
+                                    <p:set>
+                                      <p:cBhvr>
+                                        <p:cTn id="24" dur="1" fill="hold">
+                                          <p:stCondLst>
+                                            <p:cond delay="0"/>
+                                          </p:stCondLst>
+                                        </p:cTn>
+                                        <p:tgtEl>
+                                          <p:spTgt spid="18"/>
+                                        </p:tgtEl>
+                                        <p:attrNameLst>
+                                          <p:attrName>style.visibility</p:attrName>
+                                        </p:attrNameLst>
+                                      </p:cBhvr>
+                                      <p:to>
+                                        <p:strVal val="visible"/>
+                                      </p:to>
+                                    </p:set>
+                                  </p:childTnLst>
+                                </p:cTn>
+                              </p:par>
+                              <p:par>
+                                <p:cTn id="25" presetID="1" presetClass="entr" presetSubtype="0" fill="hold" grpId="0" nodeType="withEffect">
+                                  <p:stCondLst>
+                                    <p:cond delay="0"/>
+                                  </p:stCondLst>
+                                  <p:childTnLst>
+                                    <p:set>
+                                      <p:cBhvr>
+                                        <p:cTn id="26" dur="1" fill="hold">
+                                          <p:stCondLst>
+                                            <p:cond delay="0"/>
+                                          </p:stCondLst>
+                                        </p:cTn>
+                                        <p:tgtEl>
+                                          <p:spTgt spid="20"/>
+                                        </p:tgtEl>
+                                        <p:attrNameLst>
+                                          <p:attrName>style.visibility</p:attrName>
+                                        </p:attrNameLst>
+                                      </p:cBhvr>
+                                      <p:to>
+                                        <p:strVal val="visible"/>
+                                      </p:to>
+                                    </p:set>
+                                  </p:childTnLst>
+                                </p:cTn>
+                              </p:par>
+                              <p:par>
+                                <p:cTn id="27" presetID="1" presetClass="entr" presetSubtype="0" fill="hold" grpId="0" nodeType="withEffect">
+                                  <p:stCondLst>
+                                    <p:cond delay="0"/>
+                                  </p:stCondLst>
+                                  <p:childTnLst>
+                                    <p:set>
+                                      <p:cBhvr>
+                                        <p:cTn id="28" dur="1" fill="hold">
+                                          <p:stCondLst>
+                                            <p:cond delay="0"/>
+                                          </p:stCondLst>
+                                        </p:cTn>
+                                        <p:tgtEl>
+                                          <p:spTgt spid="19"/>
+                                        </p:tgtEl>
+                                        <p:attrNameLst>
+                                          <p:attrName>style.visibility</p:attrName>
+                                        </p:attrNameLst>
+                                      </p:cBhvr>
+                                      <p:to>
+                                        <p:strVal val="visible"/>
+                                      </p:to>
+                                    </p:set>
+                                  </p:childTnLst>
+                                </p:cTn>
+                              </p:par>
+                              <p:par>
+                                <p:cTn id="29" presetID="1" presetClass="exit" presetSubtype="0" fill="hold" grpId="1" nodeType="withEffect">
+                                  <p:stCondLst>
+                                    <p:cond delay="0"/>
+                                  </p:stCondLst>
+                                  <p:childTnLst>
+                                    <p:set>
+                                      <p:cBhvr>
+                                        <p:cTn id="30" dur="1" fill="hold">
+                                          <p:stCondLst>
+                                            <p:cond delay="0"/>
+                                          </p:stCondLst>
+                                        </p:cTn>
+                                        <p:tgtEl>
+                                          <p:spTgt spid="12"/>
+                                        </p:tgtEl>
+                                        <p:attrNameLst>
+                                          <p:attrName>style.visibility</p:attrName>
+                                        </p:attrNameLst>
+                                      </p:cBhvr>
+                                      <p:to>
+                                        <p:strVal val="hidden"/>
+                                      </p:to>
+                                    </p:set>
+                                  </p:childTnLst>
+                                </p:cTn>
+                              </p:par>
+                              <p:par>
+                                <p:cTn id="31" presetID="1" presetClass="exit" presetSubtype="0" fill="hold" grpId="1" nodeType="withEffect">
+                                  <p:stCondLst>
+                                    <p:cond delay="0"/>
+                                  </p:stCondLst>
+                                  <p:childTnLst>
+                                    <p:set>
+                                      <p:cBhvr>
+                                        <p:cTn id="32" dur="1" fill="hold">
+                                          <p:stCondLst>
+                                            <p:cond delay="0"/>
+                                          </p:stCondLst>
+                                        </p:cTn>
+                                        <p:tgtEl>
+                                          <p:spTgt spid="11"/>
+                                        </p:tgtEl>
+                                        <p:attrNameLst>
+                                          <p:attrName>style.visibility</p:attrName>
+                                        </p:attrNameLst>
+                                      </p:cBhvr>
+                                      <p:to>
+                                        <p:strVal val="hidden"/>
+                                      </p:to>
+                                    </p:set>
+                                  </p:childTnLst>
+                                </p:cTn>
+                              </p:par>
+                              <p:par>
+                                <p:cTn id="33" presetID="1" presetClass="exit" presetSubtype="0" fill="hold" grpId="1" nodeType="withEffect">
+                                  <p:stCondLst>
+                                    <p:cond delay="0"/>
+                                  </p:stCondLst>
+                                  <p:childTnLst>
+                                    <p:set>
+                                      <p:cBhvr>
+                                        <p:cTn id="34" dur="1" fill="hold">
+                                          <p:stCondLst>
+                                            <p:cond delay="0"/>
+                                          </p:stCondLst>
+                                        </p:cTn>
+                                        <p:tgtEl>
+                                          <p:spTgt spid="13"/>
+                                        </p:tgtEl>
+                                        <p:attrNameLst>
+                                          <p:attrName>style.visibility</p:attrName>
+                                        </p:attrNameLst>
+                                      </p:cBhvr>
+                                      <p:to>
+                                        <p:strVal val="hidden"/>
+                                      </p:to>
+                                    </p:set>
+                                  </p:childTnLst>
+                                </p:cTn>
+                              </p:par>
+                            </p:childTnLst>
+                          </p:cTn>
+                        </p:par>
+                      </p:childTnLst>
+                    </p:cTn>
+                  </p:par>
+                  <p:par>
+                    <p:cTn id="35" fill="hold">
+                      <p:stCondLst>
+                        <p:cond delay="indefinite"/>
+                      </p:stCondLst>
+                      <p:childTnLst>
+                        <p:par>
+                          <p:cTn id="36" fill="hold">
+                            <p:stCondLst>
+                              <p:cond delay="0"/>
+                            </p:stCondLst>
+                            <p:childTnLst>
+                              <p:par>
+                                <p:cTn id="37" presetID="1" presetClass="entr" presetSubtype="0" fill="hold" grpId="0" nodeType="clickEffect">
+                                  <p:stCondLst>
+                                    <p:cond delay="0"/>
+                                  </p:stCondLst>
+                                  <p:childTnLst>
+                                    <p:set>
+                                      <p:cBhvr>
+                                        <p:cTn id="38" dur="1" fill="hold">
+                                          <p:stCondLst>
+                                            <p:cond delay="0"/>
+                                          </p:stCondLst>
+                                        </p:cTn>
+                                        <p:tgtEl>
+                                          <p:spTgt spid="21"/>
+                                        </p:tgtEl>
+                                        <p:attrNameLst>
+                                          <p:attrName>style.visibility</p:attrName>
+                                        </p:attrNameLst>
+                                      </p:cBhvr>
+                                      <p:to>
+                                        <p:strVal val="visible"/>
+                                      </p:to>
+                                    </p:set>
+                                  </p:childTnLst>
+                                </p:cTn>
+                              </p:par>
+                              <p:par>
+                                <p:cTn id="39" presetID="1" presetClass="entr" presetSubtype="0" fill="hold" grpId="0" nodeType="withEffect">
+                                  <p:stCondLst>
+                                    <p:cond delay="0"/>
+                                  </p:stCondLst>
+                                  <p:childTnLst>
+                                    <p:set>
+                                      <p:cBhvr>
+                                        <p:cTn id="40" dur="1" fill="hold">
+                                          <p:stCondLst>
+                                            <p:cond delay="0"/>
+                                          </p:stCondLst>
+                                        </p:cTn>
+                                        <p:tgtEl>
+                                          <p:spTgt spid="22"/>
+                                        </p:tgtEl>
+                                        <p:attrNameLst>
+                                          <p:attrName>style.visibility</p:attrName>
+                                        </p:attrNameLst>
+                                      </p:cBhvr>
+                                      <p:to>
+                                        <p:strVal val="visible"/>
+                                      </p:to>
+                                    </p:set>
+                                  </p:childTnLst>
+                                </p:cTn>
+                              </p:par>
+                              <p:par>
+                                <p:cTn id="41" presetID="1" presetClass="exit" presetSubtype="0" fill="hold" grpId="1" nodeType="withEffect">
+                                  <p:stCondLst>
+                                    <p:cond delay="0"/>
+                                  </p:stCondLst>
+                                  <p:childTnLst>
+                                    <p:set>
+                                      <p:cBhvr>
+                                        <p:cTn id="42" dur="1" fill="hold">
+                                          <p:stCondLst>
+                                            <p:cond delay="0"/>
+                                          </p:stCondLst>
+                                        </p:cTn>
+                                        <p:tgtEl>
+                                          <p:spTgt spid="14"/>
+                                        </p:tgtEl>
+                                        <p:attrNameLst>
+                                          <p:attrName>style.visibility</p:attrName>
+                                        </p:attrNameLst>
+                                      </p:cBhvr>
+                                      <p:to>
+                                        <p:strVal val="hidden"/>
+                                      </p:to>
+                                    </p:set>
+                                  </p:childTnLst>
+                                </p:cTn>
+                              </p:par>
+                              <p:par>
+                                <p:cTn id="43" presetID="1" presetClass="exit" presetSubtype="0" fill="hold" grpId="1" nodeType="withEffect">
+                                  <p:stCondLst>
+                                    <p:cond delay="0"/>
+                                  </p:stCondLst>
+                                  <p:childTnLst>
+                                    <p:set>
+                                      <p:cBhvr>
+                                        <p:cTn id="44" dur="1" fill="hold">
+                                          <p:stCondLst>
+                                            <p:cond delay="0"/>
+                                          </p:stCondLst>
+                                        </p:cTn>
+                                        <p:tgtEl>
+                                          <p:spTgt spid="15"/>
+                                        </p:tgtEl>
+                                        <p:attrNameLst>
+                                          <p:attrName>style.visibility</p:attrName>
+                                        </p:attrNameLst>
+                                      </p:cBhvr>
+                                      <p:to>
+                                        <p:strVal val="hidden"/>
+                                      </p:to>
+                                    </p:set>
+                                  </p:childTnLst>
+                                </p:cTn>
+                              </p:par>
+                            </p:childTnLst>
+                          </p:cTn>
+                        </p:par>
+                      </p:childTnLst>
+                    </p:cTn>
+                  </p:par>
+                </p:childTnLst>
+              </p:cTn>
+              <p:prevCondLst>
+                <p:cond evt="onPrev" delay="0">
+                  <p:tgtEl>
+                    <p:sldTgt/>
+                  </p:tgtEl>
+                </p:cond>
+              </p:prevCondLst>
+              <p:nextCondLst>
+                <p:cond evt="onNext" delay="0">
+                  <p:tgtEl>
+                    <p:sldTgt/>
+                  </p:tgtEl>
+                </p:cond>
+              </p:nextCondLst>
+            </p:seq>
+          </p:childTnLst>
+        </p:cTn>
+      </p:par>
+    </p:tnLst>
+    <p:bldLst>
+      <p:bldP spid="11" grpId="0" animBg="1"/>
+      <p:bldP spid="11" grpId="1" animBg="1"/>
+      <p:bldP spid="12" grpId="0" animBg="1"/>
+      <p:bldP spid="12" grpId="1" animBg="1"/>
+      <p:bldP spid="13" grpId="0" animBg="1"/>
+      <p:bldP spid="13" grpId="1" animBg="1"/>
+      <p:bldP spid="14" grpId="0" animBg="1"/>
+      <p:bldP spid="14" grpId="1" animBg="1"/>
+      <p:bldP spid="15" grpId="0" animBg="1"/>
+      <p:bldP spid="15" grpId="1" animBg="1"/>
+      <p:bldP spid="16" grpId="0" animBg="1"/>
+      <p:bldP spid="17" grpId="0" animBg="1"/>
+      <p:bldP spid="18" grpId="0" animBg="1"/>
+      <p:bldP spid="19" grpId="0" animBg="1"/>
+      <p:bldP spid="20" grpId="0" animBg="1"/>
+      <p:bldP spid="21" grpId="0" animBg="1"/>
+      <p:bldP spid="22" grpId="0" animBg="1"/>
+    </p:bldLst>
+  </p:timing>
 </p:sld>
 </file>
 
@@ -5385,7 +6849,7 @@
           <p:cNvPr id="2" name="Title 1">
             <a:extLst>
               <a:ext uri="{FF2B5EF4-FFF2-40B4-BE49-F238E27FC236}">
-                <a16:creationId xmlns:a16="http://schemas.microsoft.com/office/drawing/2014/main" id="{9377C93F-ADA4-4755-A779-6E56BDDBC539}"/>
+                <a16:creationId xmlns:a16="http://schemas.microsoft.com/office/drawing/2014/main" id="{0FCBEB88-2D02-4A40-B89F-B36679B8CD7D}"/>
               </a:ext>
             </a:extLst>
           </p:cNvPr>
@@ -5403,7 +6867,171 @@
           <a:p>
             <a:r>
               <a:rPr lang="en-GB" dirty="0"/>
-              <a:t>System Benefits</a:t>
+              <a:t>Potential Problems</a:t>
+            </a:r>
+          </a:p>
+        </p:txBody>
+      </p:sp>
+      <p:sp>
+        <p:nvSpPr>
+          <p:cNvPr id="3" name="Content Placeholder 2">
+            <a:extLst>
+              <a:ext uri="{FF2B5EF4-FFF2-40B4-BE49-F238E27FC236}">
+                <a16:creationId xmlns:a16="http://schemas.microsoft.com/office/drawing/2014/main" id="{8C0A3400-7CF3-4FB6-B5B0-52B93D66144B}"/>
+              </a:ext>
+            </a:extLst>
+          </p:cNvPr>
+          <p:cNvSpPr>
+            <a:spLocks noGrp="1"/>
+          </p:cNvSpPr>
+          <p:nvPr>
+            <p:ph idx="1"/>
+          </p:nvPr>
+        </p:nvSpPr>
+        <p:spPr/>
+        <p:txBody>
+          <a:bodyPr>
+            <a:normAutofit/>
+          </a:bodyPr>
+          <a:lstStyle/>
+          <a:p>
+            <a:pPr>
+              <a:buFont typeface="Wingdings" panose="05000000000000000000" pitchFamily="2" charset="2"/>
+              <a:buChar char="§"/>
+            </a:pPr>
+            <a:r>
+              <a:rPr lang="en-GB" sz="2400" b="1" dirty="0">
+                <a:latin typeface="Arial Black" panose="020B0A04020102020204" pitchFamily="34" charset="0"/>
+              </a:rPr>
+              <a:t> Botting/Sybil Attacks </a:t>
+            </a:r>
+          </a:p>
+          <a:p>
+            <a:pPr>
+              <a:buFont typeface="Wingdings" panose="05000000000000000000" pitchFamily="2" charset="2"/>
+              <a:buChar char="§"/>
+            </a:pPr>
+            <a:r>
+              <a:rPr lang="en-GB" sz="2400" b="1" dirty="0">
+                <a:latin typeface="Arial Black" panose="020B0A04020102020204" pitchFamily="34" charset="0"/>
+              </a:rPr>
+              <a:t>Content Piracy </a:t>
+            </a:r>
+          </a:p>
+          <a:p>
+            <a:pPr lvl="1">
+              <a:buFont typeface="Wingdings" panose="05000000000000000000" pitchFamily="2" charset="2"/>
+              <a:buChar char="§"/>
+            </a:pPr>
+            <a:r>
+              <a:rPr lang="en-GB" sz="2200" b="1" dirty="0">
+                <a:latin typeface="Arial Black" panose="020B0A04020102020204" pitchFamily="34" charset="0"/>
+              </a:rPr>
+              <a:t>Both off platform and onto platform</a:t>
+            </a:r>
+          </a:p>
+          <a:p>
+            <a:pPr>
+              <a:buFont typeface="Wingdings" panose="05000000000000000000" pitchFamily="2" charset="2"/>
+              <a:buChar char="§"/>
+            </a:pPr>
+            <a:endParaRPr lang="en-GB" sz="2400" b="1" dirty="0">
+              <a:latin typeface="Arial Black" panose="020B0A04020102020204" pitchFamily="34" charset="0"/>
+            </a:endParaRPr>
+          </a:p>
+        </p:txBody>
+      </p:sp>
+    </p:spTree>
+    <p:extLst>
+      <p:ext uri="{BB962C8B-B14F-4D97-AF65-F5344CB8AC3E}">
+        <p14:creationId xmlns:p14="http://schemas.microsoft.com/office/powerpoint/2010/main" val="2799232870"/>
+      </p:ext>
+    </p:extLst>
+  </p:cSld>
+  <p:clrMapOvr>
+    <a:masterClrMapping/>
+  </p:clrMapOvr>
+</p:sld>
+</file>
+
+<file path=ppt/slides/slide7.xml><?xml version="1.0" encoding="utf-8"?>
+<p:sld xmlns:a="http://schemas.openxmlformats.org/drawingml/2006/main" xmlns:r="http://schemas.openxmlformats.org/officeDocument/2006/relationships" xmlns:p="http://schemas.openxmlformats.org/presentationml/2006/main">
+  <p:cSld>
+    <p:spTree>
+      <p:nvGrpSpPr>
+        <p:cNvPr id="1" name=""/>
+        <p:cNvGrpSpPr/>
+        <p:nvPr/>
+      </p:nvGrpSpPr>
+      <p:grpSpPr>
+        <a:xfrm>
+          <a:off x="0" y="0"/>
+          <a:ext cx="0" cy="0"/>
+          <a:chOff x="0" y="0"/>
+          <a:chExt cx="0" cy="0"/>
+        </a:xfrm>
+      </p:grpSpPr>
+      <p:sp>
+        <p:nvSpPr>
+          <p:cNvPr id="2" name="Title 1">
+            <a:extLst>
+              <a:ext uri="{FF2B5EF4-FFF2-40B4-BE49-F238E27FC236}">
+                <a16:creationId xmlns:a16="http://schemas.microsoft.com/office/drawing/2014/main" id="{9377C93F-ADA4-4755-A779-6E56BDDBC539}"/>
+              </a:ext>
+            </a:extLst>
+          </p:cNvPr>
+          <p:cNvSpPr>
+            <a:spLocks noGrp="1"/>
+          </p:cNvSpPr>
+          <p:nvPr>
+            <p:ph type="title"/>
+          </p:nvPr>
+        </p:nvSpPr>
+        <p:spPr/>
+        <p:txBody>
+          <a:bodyPr/>
+          <a:lstStyle/>
+          <a:p>
+            <a:r>
+              <a:rPr lang="en-GB" dirty="0"/>
+              <a:t>Progress So Far</a:t>
+            </a:r>
+          </a:p>
+        </p:txBody>
+      </p:sp>
+      <p:sp>
+        <p:nvSpPr>
+          <p:cNvPr id="4" name="TextBox 3">
+            <a:extLst>
+              <a:ext uri="{FF2B5EF4-FFF2-40B4-BE49-F238E27FC236}">
+                <a16:creationId xmlns:a16="http://schemas.microsoft.com/office/drawing/2014/main" id="{8B642141-CD4B-4771-81E0-F668AE70E090}"/>
+              </a:ext>
+            </a:extLst>
+          </p:cNvPr>
+          <p:cNvSpPr txBox="1"/>
+          <p:nvPr/>
+        </p:nvSpPr>
+        <p:spPr>
+          <a:xfrm>
+            <a:off x="5020907" y="1963270"/>
+            <a:ext cx="2150185" cy="830997"/>
+          </a:xfrm>
+          <a:prstGeom prst="rect">
+            <a:avLst/>
+          </a:prstGeom>
+          <a:noFill/>
+        </p:spPr>
+        <p:txBody>
+          <a:bodyPr wrap="square" rtlCol="0">
+            <a:spAutoFit/>
+          </a:bodyPr>
+          <a:lstStyle/>
+          <a:p>
+            <a:r>
+              <a:rPr lang="en-GB" sz="4800" b="1" dirty="0">
+                <a:latin typeface="Arial Black" panose="020B0A04020102020204" pitchFamily="34" charset="0"/>
+              </a:rPr>
+              <a:t>SLOW</a:t>
             </a:r>
           </a:p>
         </p:txBody>

</xml_diff>